<commit_message>
Added related work to presentation
</commit_message>
<xml_diff>
--- a/Presentation.pptx
+++ b/Presentation.pptx
@@ -111,6 +111,22 @@
       </a:defRPr>
     </a:lvl9pPr>
   </p:defaultTextStyle>
+  <p:extLst>
+    <p:ext uri="{EFAFB233-063F-42B5-8137-9DF3F51BA10A}">
+      <p15:sldGuideLst xmlns:p15="http://schemas.microsoft.com/office/powerpoint/2012/main">
+        <p15:guide id="1" orient="horz" pos="2160">
+          <p15:clr>
+            <a:srgbClr val="A4A3A4"/>
+          </p15:clr>
+        </p15:guide>
+        <p15:guide id="2" pos="2880">
+          <p15:clr>
+            <a:srgbClr val="A4A3A4"/>
+          </p15:clr>
+        </p15:guide>
+      </p15:sldGuideLst>
+    </p:ext>
+  </p:extLst>
 </p:presentation>
 </file>
 
@@ -295,7 +311,7 @@
           <a:p>
             <a:fld id="{60D67E45-172B-9941-AA88-D5D1B7ED3BBB}" type="datetimeFigureOut">
               <a:rPr lang="en-US" smtClean="0"/>
-              <a:t>12/1/14</a:t>
+              <a:t>12/2/2014</a:t>
             </a:fld>
             <a:endParaRPr lang="en-US"/>
           </a:p>
@@ -465,7 +481,7 @@
           <a:p>
             <a:fld id="{60D67E45-172B-9941-AA88-D5D1B7ED3BBB}" type="datetimeFigureOut">
               <a:rPr lang="en-US" smtClean="0"/>
-              <a:t>12/1/14</a:t>
+              <a:t>12/2/2014</a:t>
             </a:fld>
             <a:endParaRPr lang="en-US"/>
           </a:p>
@@ -645,7 +661,7 @@
           <a:p>
             <a:fld id="{60D67E45-172B-9941-AA88-D5D1B7ED3BBB}" type="datetimeFigureOut">
               <a:rPr lang="en-US" smtClean="0"/>
-              <a:t>12/1/14</a:t>
+              <a:t>12/2/2014</a:t>
             </a:fld>
             <a:endParaRPr lang="en-US"/>
           </a:p>
@@ -815,7 +831,7 @@
           <a:p>
             <a:fld id="{60D67E45-172B-9941-AA88-D5D1B7ED3BBB}" type="datetimeFigureOut">
               <a:rPr lang="en-US" smtClean="0"/>
-              <a:t>12/1/14</a:t>
+              <a:t>12/2/2014</a:t>
             </a:fld>
             <a:endParaRPr lang="en-US"/>
           </a:p>
@@ -1061,7 +1077,7 @@
           <a:p>
             <a:fld id="{60D67E45-172B-9941-AA88-D5D1B7ED3BBB}" type="datetimeFigureOut">
               <a:rPr lang="en-US" smtClean="0"/>
-              <a:t>12/1/14</a:t>
+              <a:t>12/2/2014</a:t>
             </a:fld>
             <a:endParaRPr lang="en-US"/>
           </a:p>
@@ -1349,7 +1365,7 @@
           <a:p>
             <a:fld id="{60D67E45-172B-9941-AA88-D5D1B7ED3BBB}" type="datetimeFigureOut">
               <a:rPr lang="en-US" smtClean="0"/>
-              <a:t>12/1/14</a:t>
+              <a:t>12/2/2014</a:t>
             </a:fld>
             <a:endParaRPr lang="en-US"/>
           </a:p>
@@ -1771,7 +1787,7 @@
           <a:p>
             <a:fld id="{60D67E45-172B-9941-AA88-D5D1B7ED3BBB}" type="datetimeFigureOut">
               <a:rPr lang="en-US" smtClean="0"/>
-              <a:t>12/1/14</a:t>
+              <a:t>12/2/2014</a:t>
             </a:fld>
             <a:endParaRPr lang="en-US"/>
           </a:p>
@@ -1889,7 +1905,7 @@
           <a:p>
             <a:fld id="{60D67E45-172B-9941-AA88-D5D1B7ED3BBB}" type="datetimeFigureOut">
               <a:rPr lang="en-US" smtClean="0"/>
-              <a:t>12/1/14</a:t>
+              <a:t>12/2/2014</a:t>
             </a:fld>
             <a:endParaRPr lang="en-US"/>
           </a:p>
@@ -1984,7 +2000,7 @@
           <a:p>
             <a:fld id="{60D67E45-172B-9941-AA88-D5D1B7ED3BBB}" type="datetimeFigureOut">
               <a:rPr lang="en-US" smtClean="0"/>
-              <a:t>12/1/14</a:t>
+              <a:t>12/2/2014</a:t>
             </a:fld>
             <a:endParaRPr lang="en-US"/>
           </a:p>
@@ -2261,7 +2277,7 @@
           <a:p>
             <a:fld id="{60D67E45-172B-9941-AA88-D5D1B7ED3BBB}" type="datetimeFigureOut">
               <a:rPr lang="en-US" smtClean="0"/>
-              <a:t>12/1/14</a:t>
+              <a:t>12/2/2014</a:t>
             </a:fld>
             <a:endParaRPr lang="en-US"/>
           </a:p>
@@ -2514,7 +2530,7 @@
           <a:p>
             <a:fld id="{60D67E45-172B-9941-AA88-D5D1B7ED3BBB}" type="datetimeFigureOut">
               <a:rPr lang="en-US" smtClean="0"/>
-              <a:t>12/1/14</a:t>
+              <a:t>12/2/2014</a:t>
             </a:fld>
             <a:endParaRPr lang="en-US"/>
           </a:p>
@@ -2727,7 +2743,7 @@
           <a:p>
             <a:fld id="{60D67E45-172B-9941-AA88-D5D1B7ED3BBB}" type="datetimeFigureOut">
               <a:rPr lang="en-US" smtClean="0"/>
-              <a:t>12/1/14</a:t>
+              <a:t>12/2/2014</a:t>
             </a:fld>
             <a:endParaRPr lang="en-US"/>
           </a:p>
@@ -3870,7 +3886,7 @@
           <a:bodyPr/>
           <a:lstStyle/>
           <a:p>
-            <a:endParaRPr lang="en-US"/>
+            <a:endParaRPr lang="en-US" dirty="0"/>
           </a:p>
         </p:txBody>
       </p:sp>
@@ -3939,10 +3955,42 @@
         </p:nvSpPr>
         <p:spPr/>
         <p:txBody>
-          <a:bodyPr/>
-          <a:lstStyle/>
-          <a:p>
-            <a:endParaRPr lang="en-US"/>
+          <a:bodyPr>
+            <a:normAutofit/>
+          </a:bodyPr>
+          <a:lstStyle/>
+          <a:p>
+            <a:r>
+              <a:rPr lang="en-US" sz="1600" dirty="0" smtClean="0"/>
+              <a:t>SRPT: Our work regarding SRPT was based off of a similar problem regarding scheduling requests to a web server. Since the web server interacts on the application layer, the web server has to worry about things such as collisions and data loss due to the routing of the network protocol. This caused the advantage of SRPT in wireless networks to diminish. However, due to the point-to-point nature of the MAC sub-layer, data loss due to routing is not something we need to worry about. </a:t>
+            </a:r>
+          </a:p>
+          <a:p>
+            <a:r>
+              <a:rPr lang="en-US" sz="1600" dirty="0" smtClean="0"/>
+              <a:t>Frame Counter: This is a variation of slotted aloha, however instead of a static </a:t>
+            </a:r>
+            <a:r>
+              <a:rPr lang="en-US" sz="1600" dirty="0" err="1" smtClean="0"/>
+              <a:t>backoff</a:t>
+            </a:r>
+            <a:r>
+              <a:rPr lang="en-US" sz="1600" dirty="0" smtClean="0"/>
+              <a:t> counter, a random </a:t>
+            </a:r>
+            <a:r>
+              <a:rPr lang="en-US" sz="1600" dirty="0" err="1" smtClean="0"/>
+              <a:t>backoff</a:t>
+            </a:r>
+            <a:r>
+              <a:rPr lang="en-US" sz="1600" dirty="0" smtClean="0"/>
+              <a:t> is utilized whenever a collision </a:t>
+            </a:r>
+            <a:r>
+              <a:rPr lang="en-US" sz="1600" smtClean="0"/>
+              <a:t>occurs.</a:t>
+            </a:r>
+            <a:endParaRPr lang="en-US" sz="1600" dirty="0" smtClean="0"/>
           </a:p>
         </p:txBody>
       </p:sp>

</xml_diff>

<commit_message>
Combined the 2 versions of the Presentation
</commit_message>
<xml_diff>
--- a/Presentation.pptx
+++ b/Presentation.pptx
@@ -8,9 +8,9 @@
     <p:sldId id="256" r:id="rId2"/>
     <p:sldId id="257" r:id="rId3"/>
     <p:sldId id="258" r:id="rId4"/>
-    <p:sldId id="261" r:id="rId5"/>
-    <p:sldId id="262" r:id="rId6"/>
-    <p:sldId id="263" r:id="rId7"/>
+    <p:sldId id="264" r:id="rId5"/>
+    <p:sldId id="265" r:id="rId6"/>
+    <p:sldId id="266" r:id="rId7"/>
     <p:sldId id="259" r:id="rId8"/>
     <p:sldId id="260" r:id="rId9"/>
   </p:sldIdLst>
@@ -113,7 +113,7 @@
   </p:defaultTextStyle>
   <p:extLst>
     <p:ext uri="{EFAFB233-063F-42B5-8137-9DF3F51BA10A}">
-      <p15:sldGuideLst xmlns:p15="http://schemas.microsoft.com/office/powerpoint/2012/main">
+      <p15:sldGuideLst xmlns:p15="http://schemas.microsoft.com/office/powerpoint/2012/main" xmlns="">
         <p15:guide id="1" orient="horz" pos="2160">
           <p15:clr>
             <a:srgbClr val="A4A3A4"/>
@@ -311,7 +311,7 @@
           <a:p>
             <a:fld id="{60D67E45-172B-9941-AA88-D5D1B7ED3BBB}" type="datetimeFigureOut">
               <a:rPr lang="en-US" smtClean="0"/>
-              <a:t>12/2/2014</a:t>
+              <a:t>12/2/14</a:t>
             </a:fld>
             <a:endParaRPr lang="en-US"/>
           </a:p>
@@ -481,7 +481,7 @@
           <a:p>
             <a:fld id="{60D67E45-172B-9941-AA88-D5D1B7ED3BBB}" type="datetimeFigureOut">
               <a:rPr lang="en-US" smtClean="0"/>
-              <a:t>12/2/2014</a:t>
+              <a:t>12/2/14</a:t>
             </a:fld>
             <a:endParaRPr lang="en-US"/>
           </a:p>
@@ -661,7 +661,7 @@
           <a:p>
             <a:fld id="{60D67E45-172B-9941-AA88-D5D1B7ED3BBB}" type="datetimeFigureOut">
               <a:rPr lang="en-US" smtClean="0"/>
-              <a:t>12/2/2014</a:t>
+              <a:t>12/2/14</a:t>
             </a:fld>
             <a:endParaRPr lang="en-US"/>
           </a:p>
@@ -831,7 +831,7 @@
           <a:p>
             <a:fld id="{60D67E45-172B-9941-AA88-D5D1B7ED3BBB}" type="datetimeFigureOut">
               <a:rPr lang="en-US" smtClean="0"/>
-              <a:t>12/2/2014</a:t>
+              <a:t>12/2/14</a:t>
             </a:fld>
             <a:endParaRPr lang="en-US"/>
           </a:p>
@@ -1077,7 +1077,7 @@
           <a:p>
             <a:fld id="{60D67E45-172B-9941-AA88-D5D1B7ED3BBB}" type="datetimeFigureOut">
               <a:rPr lang="en-US" smtClean="0"/>
-              <a:t>12/2/2014</a:t>
+              <a:t>12/2/14</a:t>
             </a:fld>
             <a:endParaRPr lang="en-US"/>
           </a:p>
@@ -1365,7 +1365,7 @@
           <a:p>
             <a:fld id="{60D67E45-172B-9941-AA88-D5D1B7ED3BBB}" type="datetimeFigureOut">
               <a:rPr lang="en-US" smtClean="0"/>
-              <a:t>12/2/2014</a:t>
+              <a:t>12/2/14</a:t>
             </a:fld>
             <a:endParaRPr lang="en-US"/>
           </a:p>
@@ -1787,7 +1787,7 @@
           <a:p>
             <a:fld id="{60D67E45-172B-9941-AA88-D5D1B7ED3BBB}" type="datetimeFigureOut">
               <a:rPr lang="en-US" smtClean="0"/>
-              <a:t>12/2/2014</a:t>
+              <a:t>12/2/14</a:t>
             </a:fld>
             <a:endParaRPr lang="en-US"/>
           </a:p>
@@ -1905,7 +1905,7 @@
           <a:p>
             <a:fld id="{60D67E45-172B-9941-AA88-D5D1B7ED3BBB}" type="datetimeFigureOut">
               <a:rPr lang="en-US" smtClean="0"/>
-              <a:t>12/2/2014</a:t>
+              <a:t>12/2/14</a:t>
             </a:fld>
             <a:endParaRPr lang="en-US"/>
           </a:p>
@@ -2000,7 +2000,7 @@
           <a:p>
             <a:fld id="{60D67E45-172B-9941-AA88-D5D1B7ED3BBB}" type="datetimeFigureOut">
               <a:rPr lang="en-US" smtClean="0"/>
-              <a:t>12/2/2014</a:t>
+              <a:t>12/2/14</a:t>
             </a:fld>
             <a:endParaRPr lang="en-US"/>
           </a:p>
@@ -2277,7 +2277,7 @@
           <a:p>
             <a:fld id="{60D67E45-172B-9941-AA88-D5D1B7ED3BBB}" type="datetimeFigureOut">
               <a:rPr lang="en-US" smtClean="0"/>
-              <a:t>12/2/2014</a:t>
+              <a:t>12/2/14</a:t>
             </a:fld>
             <a:endParaRPr lang="en-US"/>
           </a:p>
@@ -2530,7 +2530,7 @@
           <a:p>
             <a:fld id="{60D67E45-172B-9941-AA88-D5D1B7ED3BBB}" type="datetimeFigureOut">
               <a:rPr lang="en-US" smtClean="0"/>
-              <a:t>12/2/2014</a:t>
+              <a:t>12/2/14</a:t>
             </a:fld>
             <a:endParaRPr lang="en-US"/>
           </a:p>
@@ -2743,7 +2743,7 @@
           <a:p>
             <a:fld id="{60D67E45-172B-9941-AA88-D5D1B7ED3BBB}" type="datetimeFigureOut">
               <a:rPr lang="en-US" smtClean="0"/>
-              <a:t>12/2/2014</a:t>
+              <a:t>12/2/14</a:t>
             </a:fld>
             <a:endParaRPr lang="en-US"/>
           </a:p>
@@ -3622,7 +3622,7 @@
       </p:grpSpPr>
       <p:sp>
         <p:nvSpPr>
-          <p:cNvPr id="2" name="Title 1"/>
+          <p:cNvPr id="58" name="Shape 58"/>
           <p:cNvSpPr>
             <a:spLocks noGrp="1"/>
           </p:cNvSpPr>
@@ -3630,48 +3630,89 @@
             <p:ph type="title"/>
           </p:nvPr>
         </p:nvSpPr>
-        <p:spPr/>
-        <p:txBody>
-          <a:bodyPr/>
-          <a:lstStyle/>
-          <a:p>
-            <a:r>
-              <a:rPr lang="en-US" dirty="0" smtClean="0"/>
+        <p:spPr>
+          <a:xfrm>
+            <a:off x="457200" y="274638"/>
+            <a:ext cx="8229600" cy="1143001"/>
+          </a:xfrm>
+          <a:prstGeom prst="rect">
+            <a:avLst/>
+          </a:prstGeom>
+        </p:spPr>
+        <p:txBody>
+          <a:bodyPr/>
+          <a:lstStyle/>
+          <a:p>
+            <a:pPr lvl="0">
+              <a:defRPr sz="1800"/>
+            </a:pPr>
+            <a:r>
+              <a:rPr sz="4400"/>
               <a:t>SRPT</a:t>
             </a:r>
-            <a:endParaRPr lang="en-US" dirty="0"/>
-          </a:p>
-        </p:txBody>
-      </p:sp>
-      <p:sp>
-        <p:nvSpPr>
-          <p:cNvPr id="3" name="Content Placeholder 2"/>
-          <p:cNvSpPr>
-            <a:spLocks noGrp="1"/>
-          </p:cNvSpPr>
-          <p:nvPr>
-            <p:ph idx="1"/>
-          </p:nvPr>
-        </p:nvSpPr>
-        <p:spPr/>
-        <p:txBody>
-          <a:bodyPr/>
-          <a:lstStyle/>
-          <a:p>
-            <a:endParaRPr lang="en-US"/>
+          </a:p>
+        </p:txBody>
+      </p:sp>
+      <p:sp>
+        <p:nvSpPr>
+          <p:cNvPr id="59" name="Shape 59"/>
+          <p:cNvSpPr>
+            <a:spLocks noGrp="1"/>
+          </p:cNvSpPr>
+          <p:nvPr>
+            <p:ph type="body" idx="1"/>
+          </p:nvPr>
+        </p:nvSpPr>
+        <p:spPr>
+          <a:xfrm>
+            <a:off x="457200" y="1600200"/>
+            <a:ext cx="8229600" cy="4525963"/>
+          </a:xfrm>
+          <a:prstGeom prst="rect">
+            <a:avLst/>
+          </a:prstGeom>
+        </p:spPr>
+        <p:txBody>
+          <a:bodyPr/>
+          <a:lstStyle/>
+          <a:p>
+            <a:pPr marL="342899" lvl="0" indent="-342899">
+              <a:defRPr sz="1800"/>
+            </a:pPr>
+            <a:r>
+              <a:rPr sz="2800"/>
+              <a:t>Based on Shortest Remaining Processing Time for Processor Scheduling.</a:t>
+            </a:r>
+          </a:p>
+          <a:p>
+            <a:pPr marL="342899" lvl="0" indent="-342899">
+              <a:defRPr sz="1800"/>
+            </a:pPr>
+            <a:r>
+              <a:rPr sz="2800"/>
+              <a:t>The maximum for the Random Back off is based on the number of Remaining Frames</a:t>
+            </a:r>
           </a:p>
         </p:txBody>
       </p:sp>
     </p:spTree>
     <p:extLst>
       <p:ext uri="{BB962C8B-B14F-4D97-AF65-F5344CB8AC3E}">
-        <p14:creationId xmlns:p14="http://schemas.microsoft.com/office/powerpoint/2010/main" val="316588865"/>
+        <p14:creationId xmlns:p14="http://schemas.microsoft.com/office/powerpoint/2010/main" val="3863174944"/>
       </p:ext>
     </p:extLst>
   </p:cSld>
   <p:clrMapOvr>
     <a:masterClrMapping/>
   </p:clrMapOvr>
+  <mc:AlternateContent xmlns:mc="http://schemas.openxmlformats.org/markup-compatibility/2006">
+    <mc:Choice xmlns:p14="http://schemas.microsoft.com/office/powerpoint/2010/main" Requires="p14">
+      <p:transition spd="slow" p14:dur="2000"/>
+    </mc:Choice>
+    <mc:Fallback>
+      <p:transition xmlns:p14="http://schemas.microsoft.com/office/powerpoint/2010/main" spd="slow"/>
+    </mc:Fallback>
+  </mc:AlternateContent>
 </p:sld>
 </file>
 
@@ -3694,7 +3735,7 @@
       </p:grpSpPr>
       <p:sp>
         <p:nvSpPr>
-          <p:cNvPr id="2" name="Title 1"/>
+          <p:cNvPr id="61" name="Shape 61"/>
           <p:cNvSpPr>
             <a:spLocks noGrp="1"/>
           </p:cNvSpPr>
@@ -3702,48 +3743,84 @@
             <p:ph type="title"/>
           </p:nvPr>
         </p:nvSpPr>
-        <p:spPr/>
-        <p:txBody>
-          <a:bodyPr/>
-          <a:lstStyle/>
-          <a:p>
-            <a:r>
-              <a:rPr lang="en-US" dirty="0" smtClean="0"/>
+        <p:spPr>
+          <a:xfrm>
+            <a:off x="457200" y="274638"/>
+            <a:ext cx="8229600" cy="1143001"/>
+          </a:xfrm>
+          <a:prstGeom prst="rect">
+            <a:avLst/>
+          </a:prstGeom>
+        </p:spPr>
+        <p:txBody>
+          <a:bodyPr/>
+          <a:lstStyle/>
+          <a:p>
+            <a:pPr lvl="0">
+              <a:defRPr sz="1800"/>
+            </a:pPr>
+            <a:r>
+              <a:rPr sz="4400"/>
               <a:t>Frame Counter</a:t>
             </a:r>
-            <a:endParaRPr lang="en-US" dirty="0"/>
-          </a:p>
-        </p:txBody>
-      </p:sp>
-      <p:sp>
-        <p:nvSpPr>
-          <p:cNvPr id="3" name="Content Placeholder 2"/>
-          <p:cNvSpPr>
-            <a:spLocks noGrp="1"/>
-          </p:cNvSpPr>
-          <p:nvPr>
-            <p:ph idx="1"/>
-          </p:nvPr>
-        </p:nvSpPr>
-        <p:spPr/>
-        <p:txBody>
-          <a:bodyPr/>
-          <a:lstStyle/>
-          <a:p>
-            <a:endParaRPr lang="en-US"/>
+          </a:p>
+        </p:txBody>
+      </p:sp>
+      <p:sp>
+        <p:nvSpPr>
+          <p:cNvPr id="62" name="Shape 62"/>
+          <p:cNvSpPr>
+            <a:spLocks noGrp="1"/>
+          </p:cNvSpPr>
+          <p:nvPr>
+            <p:ph type="body" idx="1"/>
+          </p:nvPr>
+        </p:nvSpPr>
+        <p:spPr>
+          <a:xfrm>
+            <a:off x="457200" y="1600200"/>
+            <a:ext cx="8229600" cy="4525963"/>
+          </a:xfrm>
+          <a:prstGeom prst="rect">
+            <a:avLst/>
+          </a:prstGeom>
+        </p:spPr>
+        <p:txBody>
+          <a:bodyPr/>
+          <a:lstStyle>
+            <a:lvl1pPr marL="342899" indent="-342899">
+              <a:defRPr sz="2800"/>
+            </a:lvl1pPr>
+          </a:lstStyle>
+          <a:p>
+            <a:pPr lvl="0">
+              <a:defRPr sz="1800"/>
+            </a:pPr>
+            <a:r>
+              <a:rPr sz="2800"/>
+              <a:t>The Maximum random Back off is based on the current Frame number being sent</a:t>
+            </a:r>
           </a:p>
         </p:txBody>
       </p:sp>
     </p:spTree>
     <p:extLst>
       <p:ext uri="{BB962C8B-B14F-4D97-AF65-F5344CB8AC3E}">
-        <p14:creationId xmlns:p14="http://schemas.microsoft.com/office/powerpoint/2010/main" val="2643219066"/>
+        <p14:creationId xmlns:p14="http://schemas.microsoft.com/office/powerpoint/2010/main" val="3020937532"/>
       </p:ext>
     </p:extLst>
   </p:cSld>
   <p:clrMapOvr>
     <a:masterClrMapping/>
   </p:clrMapOvr>
+  <mc:AlternateContent xmlns:mc="http://schemas.openxmlformats.org/markup-compatibility/2006">
+    <mc:Choice xmlns:p14="http://schemas.microsoft.com/office/powerpoint/2010/main" Requires="p14">
+      <p:transition spd="slow" p14:dur="2000"/>
+    </mc:Choice>
+    <mc:Fallback>
+      <p:transition xmlns:p14="http://schemas.microsoft.com/office/powerpoint/2010/main" spd="slow"/>
+    </mc:Fallback>
+  </mc:AlternateContent>
 </p:sld>
 </file>
 
@@ -3766,7 +3843,7 @@
       </p:grpSpPr>
       <p:sp>
         <p:nvSpPr>
-          <p:cNvPr id="2" name="Title 1"/>
+          <p:cNvPr id="64" name="Shape 64"/>
           <p:cNvSpPr>
             <a:spLocks noGrp="1"/>
           </p:cNvSpPr>
@@ -3774,52 +3851,84 @@
             <p:ph type="title"/>
           </p:nvPr>
         </p:nvSpPr>
-        <p:spPr/>
-        <p:txBody>
-          <a:bodyPr/>
-          <a:lstStyle/>
-          <a:p>
-            <a:r>
-              <a:rPr lang="en-US" dirty="0" smtClean="0"/>
-              <a:t>Dynamic </a:t>
-            </a:r>
-            <a:r>
-              <a:rPr lang="en-US" dirty="0" err="1" smtClean="0"/>
-              <a:t>Backoff</a:t>
-            </a:r>
-            <a:endParaRPr lang="en-US" dirty="0"/>
-          </a:p>
-        </p:txBody>
-      </p:sp>
-      <p:sp>
-        <p:nvSpPr>
-          <p:cNvPr id="3" name="Content Placeholder 2"/>
-          <p:cNvSpPr>
-            <a:spLocks noGrp="1"/>
-          </p:cNvSpPr>
-          <p:nvPr>
-            <p:ph idx="1"/>
-          </p:nvPr>
-        </p:nvSpPr>
-        <p:spPr/>
-        <p:txBody>
-          <a:bodyPr/>
-          <a:lstStyle/>
-          <a:p>
-            <a:endParaRPr lang="en-US"/>
+        <p:spPr>
+          <a:xfrm>
+            <a:off x="457200" y="274638"/>
+            <a:ext cx="8229600" cy="1143001"/>
+          </a:xfrm>
+          <a:prstGeom prst="rect">
+            <a:avLst/>
+          </a:prstGeom>
+        </p:spPr>
+        <p:txBody>
+          <a:bodyPr/>
+          <a:lstStyle/>
+          <a:p>
+            <a:pPr lvl="0">
+              <a:defRPr sz="1800"/>
+            </a:pPr>
+            <a:r>
+              <a:rPr sz="4400"/>
+              <a:t>Dynamic Backoff</a:t>
+            </a:r>
+          </a:p>
+        </p:txBody>
+      </p:sp>
+      <p:sp>
+        <p:nvSpPr>
+          <p:cNvPr id="65" name="Shape 65"/>
+          <p:cNvSpPr>
+            <a:spLocks noGrp="1"/>
+          </p:cNvSpPr>
+          <p:nvPr>
+            <p:ph type="body" idx="1"/>
+          </p:nvPr>
+        </p:nvSpPr>
+        <p:spPr>
+          <a:xfrm>
+            <a:off x="457200" y="1600200"/>
+            <a:ext cx="8229600" cy="4525963"/>
+          </a:xfrm>
+          <a:prstGeom prst="rect">
+            <a:avLst/>
+          </a:prstGeom>
+        </p:spPr>
+        <p:txBody>
+          <a:bodyPr/>
+          <a:lstStyle>
+            <a:lvl1pPr marL="342899" indent="-342899">
+              <a:defRPr sz="2800"/>
+            </a:lvl1pPr>
+          </a:lstStyle>
+          <a:p>
+            <a:pPr lvl="0">
+              <a:defRPr sz="1800"/>
+            </a:pPr>
+            <a:r>
+              <a:rPr sz="2800"/>
+              <a:t>A node sends at a standard rate periodically checking the network traffic level, if the traffic level appears to hit a certain level, the node checks its own rate and will slow down its transmutation rate based on traffic levels.</a:t>
+            </a:r>
           </a:p>
         </p:txBody>
       </p:sp>
     </p:spTree>
     <p:extLst>
       <p:ext uri="{BB962C8B-B14F-4D97-AF65-F5344CB8AC3E}">
-        <p14:creationId xmlns:p14="http://schemas.microsoft.com/office/powerpoint/2010/main" val="380755770"/>
+        <p14:creationId xmlns:p14="http://schemas.microsoft.com/office/powerpoint/2010/main" val="3273257166"/>
       </p:ext>
     </p:extLst>
   </p:cSld>
   <p:clrMapOvr>
     <a:masterClrMapping/>
   </p:clrMapOvr>
+  <mc:AlternateContent xmlns:mc="http://schemas.openxmlformats.org/markup-compatibility/2006">
+    <mc:Choice xmlns:p14="http://schemas.microsoft.com/office/powerpoint/2010/main" Requires="p14">
+      <p:transition spd="slow" p14:dur="2000"/>
+    </mc:Choice>
+    <mc:Fallback>
+      <p:transition xmlns:p14="http://schemas.microsoft.com/office/powerpoint/2010/main" spd="slow"/>
+    </mc:Fallback>
+  </mc:AlternateContent>
 </p:sld>
 </file>
 

</xml_diff>

<commit_message>
Made it pretty, added numbers for SRPT stuff
</commit_message>
<xml_diff>
--- a/Presentation.pptx
+++ b/Presentation.pptx
@@ -8222,30 +8222,25 @@
             </a:pPr>
             <a:r>
               <a:rPr dirty="0"/>
-              <a:t>Based on Shortest Remaining Processing Time for Processor Scheduling.</a:t>
-            </a:r>
+              <a:t>Based on Shortest Remaining Processing Time for Processor </a:t>
+            </a:r>
+            <a:r>
+              <a:rPr/>
+              <a:t>Scheduling</a:t>
+            </a:r>
+            <a:r>
+              <a:rPr smtClean="0"/>
+              <a:t>.</a:t>
+            </a:r>
+            <a:endParaRPr lang="en-US" dirty="0" smtClean="0"/>
           </a:p>
           <a:p>
             <a:pPr marL="342899" lvl="0" indent="-342899">
               <a:defRPr sz="1800"/>
             </a:pPr>
             <a:r>
-              <a:rPr dirty="0"/>
-              <a:t>The maximum for the Random Back off is based on the number of Remaining </a:t>
-            </a:r>
-            <a:r>
-              <a:rPr dirty="0" smtClean="0"/>
-              <a:t>Frames</a:t>
-            </a:r>
-            <a:endParaRPr lang="en-US" dirty="0" smtClean="0"/>
-          </a:p>
-          <a:p>
-            <a:pPr marL="342899" lvl="0" indent="-342899">
-              <a:defRPr sz="1800"/>
-            </a:pPr>
-            <a:r>
               <a:rPr lang="en-US" dirty="0" smtClean="0"/>
-              <a:t>Under 0.8 load, 80% of node traffic improves by factor of 10 (based on previous work done)</a:t>
+              <a:t>Under 0.8 load, 80% of node traffic improves by factor of 10 </a:t>
             </a:r>
           </a:p>
           <a:p>
@@ -8509,15 +8504,15 @@
               <a:t>the traffic level appears to hit a certain level, the node checks its own rate and will slow down its </a:t>
             </a:r>
             <a:r>
-              <a:rPr sz="2800" smtClean="0"/>
+              <a:rPr sz="2800" dirty="0" smtClean="0"/>
               <a:t>tran</a:t>
             </a:r>
             <a:r>
-              <a:rPr lang="en-US" sz="2800" smtClean="0"/>
+              <a:rPr lang="en-US" sz="2800" dirty="0" smtClean="0"/>
               <a:t>smiss</a:t>
             </a:r>
             <a:r>
-              <a:rPr sz="2800" smtClean="0"/>
+              <a:rPr sz="2800" dirty="0" smtClean="0"/>
               <a:t>ion </a:t>
             </a:r>
             <a:r>

</xml_diff>

<commit_message>
unfixing something tha wasn't broken
</commit_message>
<xml_diff>
--- a/Presentation.pptx
+++ b/Presentation.pptx
@@ -8222,15 +8222,20 @@
             </a:pPr>
             <a:r>
               <a:rPr dirty="0"/>
-              <a:t>Based on Shortest Remaining Processing Time for Processor </a:t>
-            </a:r>
-            <a:r>
-              <a:rPr/>
-              <a:t>Scheduling</a:t>
-            </a:r>
-            <a:r>
-              <a:rPr smtClean="0"/>
+              <a:t>Based on Shortest Remaining Processing Time for Processor Scheduling</a:t>
+            </a:r>
+            <a:r>
+              <a:rPr dirty="0" smtClean="0"/>
               <a:t>.</a:t>
+            </a:r>
+          </a:p>
+          <a:p>
+            <a:pPr marL="342899" lvl="0" indent="-342899">
+              <a:defRPr sz="1800"/>
+            </a:pPr>
+            <a:r>
+              <a:rPr dirty="0" smtClean="0"/>
+              <a:t>The maximum for the Random Back off is based on the number of Remaining Frames</a:t>
             </a:r>
             <a:endParaRPr lang="en-US" dirty="0" smtClean="0"/>
           </a:p>

</xml_diff>

<commit_message>
changed conclusion to results, put the numbers there
</commit_message>
<xml_diff>
--- a/Presentation.pptx
+++ b/Presentation.pptx
@@ -8,11 +8,11 @@
     <p:sldId id="256" r:id="rId2"/>
     <p:sldId id="257" r:id="rId3"/>
     <p:sldId id="258" r:id="rId4"/>
-    <p:sldId id="264" r:id="rId5"/>
-    <p:sldId id="265" r:id="rId6"/>
-    <p:sldId id="266" r:id="rId7"/>
-    <p:sldId id="259" r:id="rId8"/>
-    <p:sldId id="260" r:id="rId9"/>
+    <p:sldId id="260" r:id="rId5"/>
+    <p:sldId id="264" r:id="rId6"/>
+    <p:sldId id="265" r:id="rId7"/>
+    <p:sldId id="266" r:id="rId8"/>
+    <p:sldId id="259" r:id="rId9"/>
   </p:sldIdLst>
   <p:sldSz cx="9144000" cy="6858000" type="screen4x3"/>
   <p:notesSz cx="6858000" cy="9144000"/>
@@ -8169,7 +8169,7 @@
       </p:grpSpPr>
       <p:sp>
         <p:nvSpPr>
-          <p:cNvPr id="58" name="Shape 58"/>
+          <p:cNvPr id="2" name="Title 1"/>
           <p:cNvSpPr>
             <a:spLocks noGrp="1"/>
           </p:cNvSpPr>
@@ -8177,28 +8177,22 @@
             <p:ph type="title"/>
           </p:nvPr>
         </p:nvSpPr>
-        <p:spPr>
-          <a:prstGeom prst="rect">
-            <a:avLst/>
-          </a:prstGeom>
-        </p:spPr>
+        <p:spPr/>
         <p:txBody>
           <a:bodyPr/>
           <a:lstStyle/>
           <a:p>
-            <a:pPr lvl="0">
-              <a:defRPr sz="1800"/>
-            </a:pPr>
-            <a:r>
-              <a:rPr sz="4400"/>
-              <a:t>SRPT</a:t>
-            </a:r>
-          </a:p>
-        </p:txBody>
-      </p:sp>
-      <p:sp>
-        <p:nvSpPr>
-          <p:cNvPr id="59" name="Shape 59"/>
+            <a:r>
+              <a:rPr lang="en-US" dirty="0" smtClean="0"/>
+              <a:t>Related Work</a:t>
+            </a:r>
+            <a:endParaRPr lang="en-US" dirty="0"/>
+          </a:p>
+        </p:txBody>
+      </p:sp>
+      <p:sp>
+        <p:nvSpPr>
+          <p:cNvPr id="3" name="Content Placeholder 2"/>
           <p:cNvSpPr>
             <a:spLocks noGrp="1"/>
           </p:cNvSpPr>
@@ -8206,77 +8200,85 @@
             <p:ph idx="1"/>
           </p:nvPr>
         </p:nvSpPr>
-        <p:spPr>
-          <a:prstGeom prst="rect">
-            <a:avLst/>
-          </a:prstGeom>
-        </p:spPr>
+        <p:spPr/>
         <p:txBody>
           <a:bodyPr>
             <a:normAutofit/>
           </a:bodyPr>
           <a:lstStyle/>
           <a:p>
-            <a:pPr marL="342899" lvl="0" indent="-342899">
-              <a:defRPr sz="1800"/>
-            </a:pPr>
-            <a:r>
-              <a:rPr dirty="0"/>
-              <a:t>Based on Shortest Remaining Processing Time for Processor Scheduling</a:t>
-            </a:r>
-            <a:r>
-              <a:rPr dirty="0" smtClean="0"/>
-              <a:t>.</a:t>
-            </a:r>
-          </a:p>
-          <a:p>
-            <a:pPr marL="342899" lvl="0" indent="-342899">
-              <a:defRPr sz="1800"/>
-            </a:pPr>
-            <a:r>
-              <a:rPr dirty="0" smtClean="0"/>
-              <a:t>The maximum for the Random Back off is based on the number of Remaining Frames</a:t>
-            </a:r>
-            <a:endParaRPr lang="en-US" dirty="0" smtClean="0"/>
-          </a:p>
-          <a:p>
-            <a:pPr marL="342899" lvl="0" indent="-342899">
-              <a:defRPr sz="1800"/>
-            </a:pPr>
-            <a:r>
-              <a:rPr lang="en-US" dirty="0" smtClean="0"/>
-              <a:t>Under 0.8 load, 80% of node traffic improves by factor of 10 </a:t>
-            </a:r>
-          </a:p>
-          <a:p>
-            <a:pPr marL="342899" lvl="0" indent="-342899">
-              <a:defRPr sz="1800"/>
-            </a:pPr>
-            <a:r>
-              <a:rPr lang="en-US" dirty="0" smtClean="0"/>
-              <a:t>Helps small frame sizes substantially, only slightly penalizes large frame sizes. </a:t>
-            </a:r>
+            <a:r>
+              <a:rPr lang="en-US" sz="1600" dirty="0" smtClean="0"/>
+              <a:t>SRPT: Our work regarding SRPT was based off of a similar problem regarding scheduling requests to a web server. </a:t>
+            </a:r>
+            <a:r>
+              <a:rPr lang="en-US" sz="1600" dirty="0" smtClean="0"/>
+              <a:t>Web server </a:t>
+            </a:r>
+            <a:r>
+              <a:rPr lang="en-US" sz="1600" dirty="0" smtClean="0"/>
+              <a:t>interacts on the application layer, </a:t>
+            </a:r>
+            <a:r>
+              <a:rPr lang="en-US" sz="1600" dirty="0" smtClean="0"/>
+              <a:t>has </a:t>
+            </a:r>
+            <a:r>
+              <a:rPr lang="en-US" sz="1600" dirty="0" smtClean="0"/>
+              <a:t>to worry about things such as collisions and data </a:t>
+            </a:r>
+            <a:r>
+              <a:rPr lang="en-US" sz="1600" dirty="0" smtClean="0"/>
+              <a:t>loss. </a:t>
+            </a:r>
+            <a:r>
+              <a:rPr lang="en-US" sz="1600" dirty="0" smtClean="0"/>
+              <a:t>This caused the advantage of SRPT in wireless networks to diminish. However, due to the point-to-point nature of the MAC sub-layer, data loss due to routing is not something we need to worry about. </a:t>
+            </a:r>
+          </a:p>
+          <a:p>
+            <a:r>
+              <a:rPr lang="en-US" sz="1600" dirty="0" smtClean="0"/>
+              <a:t>Frame Counter: This is a variation of slotted aloha, however instead of a static </a:t>
+            </a:r>
+            <a:r>
+              <a:rPr lang="en-US" sz="1600" dirty="0" err="1" smtClean="0"/>
+              <a:t>backoff</a:t>
+            </a:r>
+            <a:r>
+              <a:rPr lang="en-US" sz="1600" dirty="0" smtClean="0"/>
+              <a:t> counter, a random </a:t>
+            </a:r>
+            <a:r>
+              <a:rPr lang="en-US" sz="1600" dirty="0" err="1" smtClean="0"/>
+              <a:t>backoff</a:t>
+            </a:r>
+            <a:r>
+              <a:rPr lang="en-US" sz="1600" dirty="0" smtClean="0"/>
+              <a:t> based on the frames left to send </a:t>
+            </a:r>
+            <a:r>
+              <a:rPr lang="en-US" sz="1600" dirty="0" smtClean="0"/>
+              <a:t>is utilized whenever a collision </a:t>
+            </a:r>
+            <a:r>
+              <a:rPr lang="en-US" sz="1600" dirty="0" smtClean="0"/>
+              <a:t>occurs. </a:t>
+            </a:r>
+            <a:endParaRPr lang="en-US" sz="1600" dirty="0" smtClean="0"/>
           </a:p>
         </p:txBody>
       </p:sp>
     </p:spTree>
     <p:extLst>
       <p:ext uri="{BB962C8B-B14F-4D97-AF65-F5344CB8AC3E}">
-        <p14:creationId xmlns:p14="http://schemas.microsoft.com/office/powerpoint/2010/main" val="3863174944"/>
+        <p14:creationId xmlns:p14="http://schemas.microsoft.com/office/powerpoint/2010/main" val="1462519565"/>
       </p:ext>
     </p:extLst>
   </p:cSld>
   <p:clrMapOvr>
     <a:masterClrMapping/>
   </p:clrMapOvr>
-  <mc:AlternateContent xmlns:mc="http://schemas.openxmlformats.org/markup-compatibility/2006" xmlns:p14="http://schemas.microsoft.com/office/powerpoint/2010/main">
-    <mc:Choice Requires="p14">
-      <p:transition spd="slow" p14:dur="2000"/>
-    </mc:Choice>
-    <mc:Fallback xmlns="">
-      <p:transition xmlns:p14="http://schemas.microsoft.com/office/powerpoint/2010/main" spd="slow"/>
-    </mc:Fallback>
-  </mc:AlternateContent>
 </p:sld>
 </file>
 
@@ -8299,7 +8301,7 @@
       </p:grpSpPr>
       <p:sp>
         <p:nvSpPr>
-          <p:cNvPr id="61" name="Shape 61"/>
+          <p:cNvPr id="58" name="Shape 58"/>
           <p:cNvSpPr>
             <a:spLocks noGrp="1"/>
           </p:cNvSpPr>
@@ -8321,14 +8323,14 @@
             </a:pPr>
             <a:r>
               <a:rPr sz="4400"/>
-              <a:t>Frame Counter</a:t>
-            </a:r>
-          </a:p>
-        </p:txBody>
-      </p:sp>
-      <p:sp>
-        <p:nvSpPr>
-          <p:cNvPr id="62" name="Shape 62"/>
+              <a:t>SRPT</a:t>
+            </a:r>
+          </a:p>
+        </p:txBody>
+      </p:sp>
+      <p:sp>
+        <p:nvSpPr>
+          <p:cNvPr id="59" name="Shape 59"/>
           <p:cNvSpPr>
             <a:spLocks noGrp="1"/>
           </p:cNvSpPr>
@@ -8342,39 +8344,39 @@
           </a:prstGeom>
         </p:spPr>
         <p:txBody>
-          <a:bodyPr/>
-          <a:lstStyle>
-            <a:lvl1pPr marL="342899" indent="-342899">
-              <a:defRPr sz="2800"/>
-            </a:lvl1pPr>
-          </a:lstStyle>
-          <a:p>
-            <a:pPr lvl="0">
+          <a:bodyPr>
+            <a:normAutofit/>
+          </a:bodyPr>
+          <a:lstStyle/>
+          <a:p>
+            <a:pPr marL="342899" lvl="0" indent="-342899">
               <a:defRPr sz="1800"/>
             </a:pPr>
             <a:r>
-              <a:rPr sz="2800" dirty="0"/>
-              <a:t>The Maximum random </a:t>
-            </a:r>
-            <a:r>
-              <a:rPr lang="en-US" sz="2800" dirty="0" smtClean="0"/>
-              <a:t>b</a:t>
-            </a:r>
-            <a:r>
-              <a:rPr sz="2800" dirty="0" smtClean="0"/>
-              <a:t>ack </a:t>
-            </a:r>
-            <a:r>
-              <a:rPr sz="2800" dirty="0"/>
-              <a:t>off is based on the current Frame number being sent</a:t>
-            </a:r>
+              <a:rPr dirty="0"/>
+              <a:t>Based on Shortest Remaining Processing Time for Processor Scheduling</a:t>
+            </a:r>
+            <a:r>
+              <a:rPr dirty="0" smtClean="0"/>
+              <a:t>.</a:t>
+            </a:r>
+          </a:p>
+          <a:p>
+            <a:pPr marL="342899" lvl="0" indent="-342899">
+              <a:defRPr sz="1800"/>
+            </a:pPr>
+            <a:r>
+              <a:rPr dirty="0" smtClean="0"/>
+              <a:t>The maximum for the Random Back off is based on the number of Remaining Frames</a:t>
+            </a:r>
+            <a:endParaRPr lang="en-US" dirty="0" smtClean="0"/>
           </a:p>
         </p:txBody>
       </p:sp>
     </p:spTree>
     <p:extLst>
       <p:ext uri="{BB962C8B-B14F-4D97-AF65-F5344CB8AC3E}">
-        <p14:creationId xmlns:p14="http://schemas.microsoft.com/office/powerpoint/2010/main" val="3020937532"/>
+        <p14:creationId xmlns:p14="http://schemas.microsoft.com/office/powerpoint/2010/main" val="3863174944"/>
       </p:ext>
     </p:extLst>
   </p:cSld>
@@ -8411,7 +8413,7 @@
       </p:grpSpPr>
       <p:sp>
         <p:nvSpPr>
-          <p:cNvPr id="64" name="Shape 64"/>
+          <p:cNvPr id="61" name="Shape 61"/>
           <p:cNvSpPr>
             <a:spLocks noGrp="1"/>
           </p:cNvSpPr>
@@ -8433,14 +8435,14 @@
             </a:pPr>
             <a:r>
               <a:rPr sz="4400"/>
-              <a:t>Dynamic Backoff</a:t>
-            </a:r>
-          </a:p>
-        </p:txBody>
-      </p:sp>
-      <p:sp>
-        <p:nvSpPr>
-          <p:cNvPr id="65" name="Shape 65"/>
+              <a:t>Frame Counter</a:t>
+            </a:r>
+          </a:p>
+        </p:txBody>
+      </p:sp>
+      <p:sp>
+        <p:nvSpPr>
+          <p:cNvPr id="62" name="Shape 62"/>
           <p:cNvSpPr>
             <a:spLocks noGrp="1"/>
           </p:cNvSpPr>
@@ -8466,71 +8468,42 @@
             </a:pPr>
             <a:r>
               <a:rPr sz="2800" dirty="0"/>
-              <a:t>A node sends at a standard </a:t>
+              <a:t>The Maximum random </a:t>
+            </a:r>
+            <a:r>
+              <a:rPr lang="en-US" sz="2800" dirty="0" smtClean="0"/>
+              <a:t>b</a:t>
             </a:r>
             <a:r>
               <a:rPr sz="2800" dirty="0" smtClean="0"/>
-              <a:t>rate</a:t>
-            </a:r>
+              <a:t>ack </a:t>
+            </a:r>
+            <a:r>
+              <a:rPr sz="2800" dirty="0"/>
+              <a:t>off is based on the current Frame number being </a:t>
+            </a:r>
+            <a:r>
+              <a:rPr sz="2800" dirty="0" smtClean="0"/>
+              <a:t>sent</a:t>
+            </a:r>
+            <a:endParaRPr lang="en-US" sz="2800" dirty="0" smtClean="0"/>
+          </a:p>
+          <a:p>
+            <a:pPr lvl="0">
+              <a:defRPr sz="1800"/>
+            </a:pPr>
             <a:r>
               <a:rPr lang="en-US" sz="2800" dirty="0" smtClean="0"/>
-              <a:t>,</a:t>
-            </a:r>
-            <a:r>
-              <a:rPr sz="2800" dirty="0" smtClean="0"/>
-              <a:t> </a:t>
-            </a:r>
-            <a:r>
-              <a:rPr sz="2800" dirty="0"/>
-              <a:t>periodically checking the network traffic </a:t>
-            </a:r>
-            <a:r>
-              <a:rPr sz="2800" dirty="0" smtClean="0"/>
-              <a:t>level</a:t>
-            </a:r>
-            <a:r>
-              <a:rPr lang="en-US" sz="2800" dirty="0" smtClean="0"/>
-              <a:t>.</a:t>
-            </a:r>
-            <a:r>
-              <a:rPr sz="2800" dirty="0" smtClean="0"/>
-              <a:t> </a:t>
-            </a:r>
-            <a:r>
-              <a:rPr lang="en-US" sz="2800" dirty="0" smtClean="0"/>
-              <a:t>I</a:t>
-            </a:r>
-            <a:r>
-              <a:rPr sz="2800" dirty="0" smtClean="0"/>
-              <a:t>f </a:t>
-            </a:r>
-            <a:r>
-              <a:rPr sz="2800" dirty="0"/>
-              <a:t>the traffic level appears to hit a certain level, the node checks its own rate and will slow down its </a:t>
-            </a:r>
-            <a:r>
-              <a:rPr sz="2800" dirty="0" smtClean="0"/>
-              <a:t>tran</a:t>
-            </a:r>
-            <a:r>
-              <a:rPr lang="en-US" sz="2800" dirty="0" smtClean="0"/>
-              <a:t>smiss</a:t>
-            </a:r>
-            <a:r>
-              <a:rPr sz="2800" dirty="0" smtClean="0"/>
-              <a:t>ion </a:t>
-            </a:r>
-            <a:r>
-              <a:rPr sz="2800" dirty="0"/>
-              <a:t>rate based on traffic levels.</a:t>
-            </a:r>
+              <a:t>Theoretically, improvement will be similar to that of SRPT, but can handle unknown stream sizes</a:t>
+            </a:r>
+            <a:endParaRPr sz="2800" dirty="0"/>
           </a:p>
         </p:txBody>
       </p:sp>
     </p:spTree>
     <p:extLst>
       <p:ext uri="{BB962C8B-B14F-4D97-AF65-F5344CB8AC3E}">
-        <p14:creationId xmlns:p14="http://schemas.microsoft.com/office/powerpoint/2010/main" val="3273257166"/>
+        <p14:creationId xmlns:p14="http://schemas.microsoft.com/office/powerpoint/2010/main" val="3020937532"/>
       </p:ext>
     </p:extLst>
   </p:cSld>
@@ -8567,7 +8540,7 @@
       </p:grpSpPr>
       <p:sp>
         <p:nvSpPr>
-          <p:cNvPr id="2" name="Title 1"/>
+          <p:cNvPr id="64" name="Shape 64"/>
           <p:cNvSpPr>
             <a:spLocks noGrp="1"/>
           </p:cNvSpPr>
@@ -8575,22 +8548,28 @@
             <p:ph type="title"/>
           </p:nvPr>
         </p:nvSpPr>
-        <p:spPr/>
+        <p:spPr>
+          <a:prstGeom prst="rect">
+            <a:avLst/>
+          </a:prstGeom>
+        </p:spPr>
         <p:txBody>
           <a:bodyPr/>
           <a:lstStyle/>
           <a:p>
-            <a:r>
-              <a:rPr lang="en-US" dirty="0" smtClean="0"/>
-              <a:t>Conclusion</a:t>
-            </a:r>
-            <a:endParaRPr lang="en-US" dirty="0"/>
-          </a:p>
-        </p:txBody>
-      </p:sp>
-      <p:sp>
-        <p:nvSpPr>
-          <p:cNvPr id="3" name="Content Placeholder 2"/>
+            <a:pPr lvl="0">
+              <a:defRPr sz="1800"/>
+            </a:pPr>
+            <a:r>
+              <a:rPr sz="4400"/>
+              <a:t>Dynamic Backoff</a:t>
+            </a:r>
+          </a:p>
+        </p:txBody>
+      </p:sp>
+      <p:sp>
+        <p:nvSpPr>
+          <p:cNvPr id="65" name="Shape 65"/>
           <p:cNvSpPr>
             <a:spLocks noGrp="1"/>
           </p:cNvSpPr>
@@ -8598,31 +8577,103 @@
             <p:ph idx="1"/>
           </p:nvPr>
         </p:nvSpPr>
-        <p:spPr/>
+        <p:spPr>
+          <a:prstGeom prst="rect">
+            <a:avLst/>
+          </a:prstGeom>
+        </p:spPr>
         <p:txBody>
           <a:bodyPr/>
-          <a:lstStyle/>
-          <a:p>
-            <a:r>
-              <a:rPr lang="en-US" dirty="0" smtClean="0"/>
-              <a:t>It is indeed possible to increase the throughput for 802.11 using a biased MAC protocol. </a:t>
-            </a:r>
-          </a:p>
-          <a:p>
-            <a:endParaRPr lang="en-US" dirty="0"/>
+          <a:lstStyle>
+            <a:lvl1pPr marL="342899" indent="-342899">
+              <a:defRPr sz="2800"/>
+            </a:lvl1pPr>
+          </a:lstStyle>
+          <a:p>
+            <a:pPr lvl="0">
+              <a:defRPr sz="1800"/>
+            </a:pPr>
+            <a:r>
+              <a:rPr sz="2800" dirty="0"/>
+              <a:t>A node sends at a standard </a:t>
+            </a:r>
+            <a:r>
+              <a:rPr sz="2800" dirty="0" smtClean="0"/>
+              <a:t>rate</a:t>
+            </a:r>
+            <a:r>
+              <a:rPr lang="en-US" sz="2800" dirty="0" smtClean="0"/>
+              <a:t>,</a:t>
+            </a:r>
+            <a:r>
+              <a:rPr sz="2800" dirty="0" smtClean="0"/>
+              <a:t> </a:t>
+            </a:r>
+            <a:r>
+              <a:rPr sz="2800" dirty="0"/>
+              <a:t>periodically checking the network traffic </a:t>
+            </a:r>
+            <a:r>
+              <a:rPr sz="2800" dirty="0" smtClean="0"/>
+              <a:t>level</a:t>
+            </a:r>
+            <a:r>
+              <a:rPr lang="en-US" sz="2800" dirty="0" smtClean="0"/>
+              <a:t>.</a:t>
+            </a:r>
+            <a:r>
+              <a:rPr sz="2800" dirty="0" smtClean="0"/>
+              <a:t> </a:t>
+            </a:r>
+            <a:r>
+              <a:rPr lang="en-US" sz="2800" dirty="0" smtClean="0"/>
+              <a:t>I</a:t>
+            </a:r>
+            <a:r>
+              <a:rPr sz="2800" dirty="0" smtClean="0"/>
+              <a:t>f </a:t>
+            </a:r>
+            <a:r>
+              <a:rPr sz="2800" dirty="0"/>
+              <a:t>the traffic level appears to hit a certain level, the node checks its own rate and will slow down its </a:t>
+            </a:r>
+            <a:r>
+              <a:rPr sz="2800" dirty="0" smtClean="0"/>
+              <a:t>tran</a:t>
+            </a:r>
+            <a:r>
+              <a:rPr lang="en-US" sz="2800" dirty="0" smtClean="0"/>
+              <a:t>smiss</a:t>
+            </a:r>
+            <a:r>
+              <a:rPr sz="2800" dirty="0" smtClean="0"/>
+              <a:t>ion </a:t>
+            </a:r>
+            <a:r>
+              <a:rPr sz="2800" dirty="0"/>
+              <a:t>rate based on traffic levels.</a:t>
+            </a:r>
           </a:p>
         </p:txBody>
       </p:sp>
     </p:spTree>
     <p:extLst>
       <p:ext uri="{BB962C8B-B14F-4D97-AF65-F5344CB8AC3E}">
-        <p14:creationId xmlns:p14="http://schemas.microsoft.com/office/powerpoint/2010/main" val="205034036"/>
+        <p14:creationId xmlns:p14="http://schemas.microsoft.com/office/powerpoint/2010/main" val="3273257166"/>
       </p:ext>
     </p:extLst>
   </p:cSld>
   <p:clrMapOvr>
     <a:masterClrMapping/>
   </p:clrMapOvr>
+  <mc:AlternateContent xmlns:mc="http://schemas.openxmlformats.org/markup-compatibility/2006" xmlns:p14="http://schemas.microsoft.com/office/powerpoint/2010/main">
+    <mc:Choice Requires="p14">
+      <p:transition spd="slow" p14:dur="2000"/>
+    </mc:Choice>
+    <mc:Fallback xmlns="">
+      <p:transition xmlns:p14="http://schemas.microsoft.com/office/powerpoint/2010/main" spd="slow"/>
+    </mc:Fallback>
+  </mc:AlternateContent>
 </p:sld>
 </file>
 
@@ -8660,7 +8711,7 @@
           <a:p>
             <a:r>
               <a:rPr lang="en-US" dirty="0" smtClean="0"/>
-              <a:t>Related Work</a:t>
+              <a:t>Results</a:t>
             </a:r>
             <a:endParaRPr lang="en-US" dirty="0"/>
           </a:p>
@@ -8678,77 +8729,54 @@
         </p:nvSpPr>
         <p:spPr/>
         <p:txBody>
-          <a:bodyPr>
-            <a:normAutofit/>
-          </a:bodyPr>
+          <a:bodyPr/>
           <a:lstStyle/>
           <a:p>
             <a:r>
-              <a:rPr lang="en-US" sz="1600" dirty="0" smtClean="0"/>
-              <a:t>SRPT: Our work regarding SRPT was based off of a similar problem regarding scheduling requests to a web server. </a:t>
-            </a:r>
-            <a:r>
-              <a:rPr lang="en-US" sz="1600" dirty="0" smtClean="0"/>
-              <a:t>Web server </a:t>
-            </a:r>
-            <a:r>
-              <a:rPr lang="en-US" sz="1600" dirty="0" smtClean="0"/>
-              <a:t>interacts on the application layer, </a:t>
-            </a:r>
-            <a:r>
-              <a:rPr lang="en-US" sz="1600" dirty="0" smtClean="0"/>
-              <a:t>has </a:t>
-            </a:r>
-            <a:r>
-              <a:rPr lang="en-US" sz="1600" dirty="0" smtClean="0"/>
-              <a:t>to worry about things such as collisions and data </a:t>
-            </a:r>
-            <a:r>
-              <a:rPr lang="en-US" sz="1600" dirty="0" smtClean="0"/>
-              <a:t>loss. </a:t>
-            </a:r>
-            <a:r>
-              <a:rPr lang="en-US" sz="1600" dirty="0" smtClean="0"/>
-              <a:t>This caused the advantage of SRPT in wireless networks to diminish. However, due to the point-to-point nature of the MAC sub-layer, data loss due to routing is not something we need to worry about. </a:t>
-            </a:r>
-          </a:p>
-          <a:p>
-            <a:r>
-              <a:rPr lang="en-US" sz="1600" dirty="0" smtClean="0"/>
-              <a:t>Frame Counter: This is a variation of slotted aloha, however instead of a static </a:t>
-            </a:r>
-            <a:r>
-              <a:rPr lang="en-US" sz="1600" dirty="0" err="1" smtClean="0"/>
-              <a:t>backoff</a:t>
-            </a:r>
-            <a:r>
-              <a:rPr lang="en-US" sz="1600" dirty="0" smtClean="0"/>
-              <a:t> counter, a random </a:t>
-            </a:r>
-            <a:r>
-              <a:rPr lang="en-US" sz="1600" dirty="0" err="1" smtClean="0"/>
-              <a:t>backoff</a:t>
-            </a:r>
-            <a:r>
-              <a:rPr lang="en-US" sz="1600" dirty="0" smtClean="0"/>
-              <a:t> based on the frames left to send </a:t>
-            </a:r>
-            <a:r>
-              <a:rPr lang="en-US" sz="1600" dirty="0" smtClean="0"/>
-              <a:t>is utilized whenever a collision </a:t>
-            </a:r>
-            <a:r>
-              <a:rPr lang="en-US" sz="1600" dirty="0" smtClean="0"/>
-              <a:t>occurs. </a:t>
-            </a:r>
-            <a:endParaRPr lang="en-US" sz="1600" dirty="0" smtClean="0"/>
+              <a:rPr lang="en-US" dirty="0" smtClean="0"/>
+              <a:t>It is indeed possible to increase the throughput for 802.11 using a biased MAC protocol using a model based </a:t>
+            </a:r>
+            <a:r>
+              <a:rPr lang="en-US" smtClean="0"/>
+              <a:t>off of SRPT. </a:t>
+            </a:r>
+            <a:endParaRPr lang="en-US" dirty="0" smtClean="0"/>
+          </a:p>
+          <a:p>
+            <a:pPr marL="342899" lvl="0" indent="-342899">
+              <a:defRPr sz="1800"/>
+            </a:pPr>
+            <a:r>
+              <a:rPr lang="en-US" dirty="0"/>
+              <a:t>Under 0.8 load, 80% of node traffic improves by factor of </a:t>
+            </a:r>
+            <a:r>
+              <a:rPr lang="en-US" dirty="0" smtClean="0"/>
+              <a:t>10 </a:t>
+            </a:r>
+            <a:endParaRPr lang="en-US" dirty="0"/>
+          </a:p>
+          <a:p>
+            <a:pPr marL="342899" lvl="0" indent="-342899">
+              <a:defRPr sz="1800"/>
+            </a:pPr>
+            <a:r>
+              <a:rPr lang="en-US" dirty="0"/>
+              <a:t>Helps small frame sizes substantially, only slightly penalizes large frame sizes. </a:t>
+            </a:r>
+          </a:p>
+          <a:p>
+            <a:endParaRPr lang="en-US" dirty="0" smtClean="0"/>
+          </a:p>
+          <a:p>
+            <a:endParaRPr lang="en-US" dirty="0"/>
           </a:p>
         </p:txBody>
       </p:sp>
     </p:spTree>
     <p:extLst>
       <p:ext uri="{BB962C8B-B14F-4D97-AF65-F5344CB8AC3E}">
-        <p14:creationId xmlns:p14="http://schemas.microsoft.com/office/powerpoint/2010/main" val="1462519565"/>
+        <p14:creationId xmlns:p14="http://schemas.microsoft.com/office/powerpoint/2010/main" val="205034036"/>
       </p:ext>
     </p:extLst>
   </p:cSld>

</xml_diff>